<commit_message>
Changed style for presentation
</commit_message>
<xml_diff>
--- a/part1.pptx
+++ b/part1.pptx
@@ -11202,7 +11202,7 @@
           <a:p>
             <a:fld id="{4ECA1A39-D48C-4DEB-B207-893886E3C72B}" type="datetimeFigureOut">
               <a:rPr lang="en-US" smtClean="0"/>
-              <a:t>3/16/2016</a:t>
+              <a:t>3/22/2016</a:t>
             </a:fld>
             <a:endParaRPr lang="en-US"/>
           </a:p>
@@ -24502,7 +24502,7 @@
           <a:p>
             <a:fld id="{4ECA1A39-D48C-4DEB-B207-893886E3C72B}" type="datetimeFigureOut">
               <a:rPr lang="en-US" smtClean="0"/>
-              <a:t>3/16/2016</a:t>
+              <a:t>3/22/2016</a:t>
             </a:fld>
             <a:endParaRPr lang="en-US"/>
           </a:p>
@@ -26985,6 +26985,35 @@
 <file path=ppt/slides/slide10.xml><?xml version="1.0" encoding="utf-8"?>
 <p:sld xmlns:a="http://schemas.openxmlformats.org/drawingml/2006/main" xmlns:r="http://schemas.openxmlformats.org/officeDocument/2006/relationships" xmlns:p="http://schemas.openxmlformats.org/presentationml/2006/main">
   <p:cSld>
+    <p:bg>
+      <p:bgPr>
+        <a:gradFill>
+          <a:gsLst>
+            <a:gs pos="0">
+              <a:schemeClr val="accent1">
+                <a:lumMod val="0"/>
+                <a:lumOff val="100000"/>
+              </a:schemeClr>
+            </a:gs>
+            <a:gs pos="30000">
+              <a:schemeClr val="accent1">
+                <a:lumMod val="0"/>
+                <a:lumOff val="100000"/>
+              </a:schemeClr>
+            </a:gs>
+            <a:gs pos="100000">
+              <a:schemeClr val="accent1">
+                <a:lumMod val="100000"/>
+              </a:schemeClr>
+            </a:gs>
+          </a:gsLst>
+          <a:path path="circle">
+            <a:fillToRect l="50000" t="-80000" r="50000" b="180000"/>
+          </a:path>
+        </a:gradFill>
+        <a:effectLst/>
+      </p:bgPr>
+    </p:bg>
     <p:spTree>
       <p:nvGrpSpPr>
         <p:cNvPr id="1" name=""/>
@@ -27091,12 +27120,48 @@
   <p:clrMapOvr>
     <a:masterClrMapping/>
   </p:clrMapOvr>
+  <p:timing>
+    <p:tnLst>
+      <p:par>
+        <p:cTn id="1" dur="indefinite" restart="never" nodeType="tmRoot"/>
+      </p:par>
+    </p:tnLst>
+  </p:timing>
 </p:sld>
 </file>
 
 <file path=ppt/slides/slide11.xml><?xml version="1.0" encoding="utf-8"?>
 <p:sld xmlns:a="http://schemas.openxmlformats.org/drawingml/2006/main" xmlns:r="http://schemas.openxmlformats.org/officeDocument/2006/relationships" xmlns:p="http://schemas.openxmlformats.org/presentationml/2006/main">
   <p:cSld>
+    <p:bg>
+      <p:bgPr>
+        <a:gradFill>
+          <a:gsLst>
+            <a:gs pos="0">
+              <a:schemeClr val="accent1">
+                <a:lumMod val="0"/>
+                <a:lumOff val="100000"/>
+              </a:schemeClr>
+            </a:gs>
+            <a:gs pos="30000">
+              <a:schemeClr val="accent1">
+                <a:lumMod val="0"/>
+                <a:lumOff val="100000"/>
+              </a:schemeClr>
+            </a:gs>
+            <a:gs pos="100000">
+              <a:schemeClr val="accent1">
+                <a:lumMod val="100000"/>
+              </a:schemeClr>
+            </a:gs>
+          </a:gsLst>
+          <a:path path="circle">
+            <a:fillToRect l="50000" t="-80000" r="50000" b="180000"/>
+          </a:path>
+        </a:gradFill>
+        <a:effectLst/>
+      </p:bgPr>
+    </p:bg>
     <p:spTree>
       <p:nvGrpSpPr>
         <p:cNvPr id="1" name=""/>
@@ -27175,7 +27240,6 @@
               <a:rPr lang="en-US" sz="3200" b="1" i="1" dirty="0"/>
               <a:t>add &lt;filename&gt;</a:t>
             </a:r>
-            <a:endParaRPr lang="en-US" sz="3200" b="1" i="1" dirty="0"/>
           </a:p>
           <a:p>
             <a:pPr algn="ctr"/>
@@ -27200,8 +27264,17 @@
             </a:r>
             <a:r>
               <a:rPr lang="en-US" sz="3200" b="1" i="1" dirty="0" smtClean="0"/>
-              <a:t>“My first commit ;)“</a:t>
-            </a:r>
+              <a:t>&lt;</a:t>
+            </a:r>
+            <a:r>
+              <a:rPr lang="en-US" sz="3200" b="1" i="1" dirty="0" err="1" smtClean="0"/>
+              <a:t>commit_message</a:t>
+            </a:r>
+            <a:r>
+              <a:rPr lang="en-US" sz="3200" b="1" i="1" dirty="0" smtClean="0"/>
+              <a:t>&gt;</a:t>
+            </a:r>
+            <a:endParaRPr lang="en-US" sz="3200" b="1" i="1" dirty="0" smtClean="0"/>
           </a:p>
           <a:p>
             <a:pPr algn="ctr"/>
@@ -27227,12 +27300,48 @@
   <p:clrMapOvr>
     <a:masterClrMapping/>
   </p:clrMapOvr>
+  <p:timing>
+    <p:tnLst>
+      <p:par>
+        <p:cTn id="1" dur="indefinite" restart="never" nodeType="tmRoot"/>
+      </p:par>
+    </p:tnLst>
+  </p:timing>
 </p:sld>
 </file>
 
 <file path=ppt/slides/slide12.xml><?xml version="1.0" encoding="utf-8"?>
 <p:sld xmlns:a="http://schemas.openxmlformats.org/drawingml/2006/main" xmlns:r="http://schemas.openxmlformats.org/officeDocument/2006/relationships" xmlns:p="http://schemas.openxmlformats.org/presentationml/2006/main">
   <p:cSld>
+    <p:bg>
+      <p:bgPr>
+        <a:gradFill>
+          <a:gsLst>
+            <a:gs pos="0">
+              <a:schemeClr val="accent1">
+                <a:lumMod val="0"/>
+                <a:lumOff val="100000"/>
+              </a:schemeClr>
+            </a:gs>
+            <a:gs pos="30000">
+              <a:schemeClr val="accent1">
+                <a:lumMod val="0"/>
+                <a:lumOff val="100000"/>
+              </a:schemeClr>
+            </a:gs>
+            <a:gs pos="100000">
+              <a:schemeClr val="accent1">
+                <a:lumMod val="100000"/>
+              </a:schemeClr>
+            </a:gs>
+          </a:gsLst>
+          <a:path path="circle">
+            <a:fillToRect l="50000" t="-80000" r="50000" b="180000"/>
+          </a:path>
+        </a:gradFill>
+        <a:effectLst/>
+      </p:bgPr>
+    </p:bg>
     <p:spTree>
       <p:nvGrpSpPr>
         <p:cNvPr id="1" name=""/>
@@ -27351,12 +27460,48 @@
   <p:clrMapOvr>
     <a:masterClrMapping/>
   </p:clrMapOvr>
+  <p:timing>
+    <p:tnLst>
+      <p:par>
+        <p:cTn id="1" dur="indefinite" restart="never" nodeType="tmRoot"/>
+      </p:par>
+    </p:tnLst>
+  </p:timing>
 </p:sld>
 </file>
 
 <file path=ppt/slides/slide13.xml><?xml version="1.0" encoding="utf-8"?>
 <p:sld xmlns:a="http://schemas.openxmlformats.org/drawingml/2006/main" xmlns:r="http://schemas.openxmlformats.org/officeDocument/2006/relationships" xmlns:p="http://schemas.openxmlformats.org/presentationml/2006/main">
   <p:cSld>
+    <p:bg>
+      <p:bgPr>
+        <a:gradFill>
+          <a:gsLst>
+            <a:gs pos="0">
+              <a:schemeClr val="accent1">
+                <a:lumMod val="0"/>
+                <a:lumOff val="100000"/>
+              </a:schemeClr>
+            </a:gs>
+            <a:gs pos="30000">
+              <a:schemeClr val="accent1">
+                <a:lumMod val="0"/>
+                <a:lumOff val="100000"/>
+              </a:schemeClr>
+            </a:gs>
+            <a:gs pos="100000">
+              <a:schemeClr val="accent1">
+                <a:lumMod val="100000"/>
+              </a:schemeClr>
+            </a:gs>
+          </a:gsLst>
+          <a:path path="circle">
+            <a:fillToRect l="50000" t="-80000" r="50000" b="180000"/>
+          </a:path>
+        </a:gradFill>
+        <a:effectLst/>
+      </p:bgPr>
+    </p:bg>
     <p:spTree>
       <p:nvGrpSpPr>
         <p:cNvPr id="1" name=""/>
@@ -27390,7 +27535,6 @@
               <a:rPr lang="en-US" dirty="0"/>
               <a:t>Get in touch with remote repo</a:t>
             </a:r>
-            <a:endParaRPr lang="en-US" dirty="0"/>
           </a:p>
         </p:txBody>
       </p:sp>
@@ -27475,12 +27619,48 @@
   <p:clrMapOvr>
     <a:masterClrMapping/>
   </p:clrMapOvr>
+  <p:timing>
+    <p:tnLst>
+      <p:par>
+        <p:cTn id="1" dur="indefinite" restart="never" nodeType="tmRoot"/>
+      </p:par>
+    </p:tnLst>
+  </p:timing>
 </p:sld>
 </file>
 
 <file path=ppt/slides/slide14.xml><?xml version="1.0" encoding="utf-8"?>
 <p:sld xmlns:a="http://schemas.openxmlformats.org/drawingml/2006/main" xmlns:r="http://schemas.openxmlformats.org/officeDocument/2006/relationships" xmlns:p="http://schemas.openxmlformats.org/presentationml/2006/main">
   <p:cSld>
+    <p:bg>
+      <p:bgPr>
+        <a:gradFill>
+          <a:gsLst>
+            <a:gs pos="0">
+              <a:schemeClr val="accent1">
+                <a:lumMod val="0"/>
+                <a:lumOff val="100000"/>
+              </a:schemeClr>
+            </a:gs>
+            <a:gs pos="30000">
+              <a:schemeClr val="accent1">
+                <a:lumMod val="0"/>
+                <a:lumOff val="100000"/>
+              </a:schemeClr>
+            </a:gs>
+            <a:gs pos="100000">
+              <a:schemeClr val="accent1">
+                <a:lumMod val="100000"/>
+              </a:schemeClr>
+            </a:gs>
+          </a:gsLst>
+          <a:path path="circle">
+            <a:fillToRect l="50000" t="-80000" r="50000" b="180000"/>
+          </a:path>
+        </a:gradFill>
+        <a:effectLst/>
+      </p:bgPr>
+    </p:bg>
     <p:spTree>
       <p:nvGrpSpPr>
         <p:cNvPr id="1" name=""/>
@@ -27599,12 +27779,48 @@
   <p:clrMapOvr>
     <a:masterClrMapping/>
   </p:clrMapOvr>
+  <p:timing>
+    <p:tnLst>
+      <p:par>
+        <p:cTn id="1" dur="indefinite" restart="never" nodeType="tmRoot"/>
+      </p:par>
+    </p:tnLst>
+  </p:timing>
 </p:sld>
 </file>
 
 <file path=ppt/slides/slide15.xml><?xml version="1.0" encoding="utf-8"?>
 <p:sld xmlns:a="http://schemas.openxmlformats.org/drawingml/2006/main" xmlns:r="http://schemas.openxmlformats.org/officeDocument/2006/relationships" xmlns:p="http://schemas.openxmlformats.org/presentationml/2006/main">
   <p:cSld>
+    <p:bg>
+      <p:bgPr>
+        <a:gradFill>
+          <a:gsLst>
+            <a:gs pos="0">
+              <a:schemeClr val="accent1">
+                <a:lumMod val="0"/>
+                <a:lumOff val="100000"/>
+              </a:schemeClr>
+            </a:gs>
+            <a:gs pos="30000">
+              <a:schemeClr val="accent1">
+                <a:lumMod val="0"/>
+                <a:lumOff val="100000"/>
+              </a:schemeClr>
+            </a:gs>
+            <a:gs pos="100000">
+              <a:schemeClr val="accent1">
+                <a:lumMod val="100000"/>
+              </a:schemeClr>
+            </a:gs>
+          </a:gsLst>
+          <a:path path="circle">
+            <a:fillToRect l="50000" t="-80000" r="50000" b="180000"/>
+          </a:path>
+        </a:gradFill>
+        <a:effectLst/>
+      </p:bgPr>
+    </p:bg>
     <p:spTree>
       <p:nvGrpSpPr>
         <p:cNvPr id="1" name=""/>
@@ -27652,12 +27868,48 @@
   <p:clrMapOvr>
     <a:masterClrMapping/>
   </p:clrMapOvr>
+  <p:timing>
+    <p:tnLst>
+      <p:par>
+        <p:cTn id="1" dur="indefinite" restart="never" nodeType="tmRoot"/>
+      </p:par>
+    </p:tnLst>
+  </p:timing>
 </p:sld>
 </file>
 
 <file path=ppt/slides/slide16.xml><?xml version="1.0" encoding="utf-8"?>
 <p:sld xmlns:a="http://schemas.openxmlformats.org/drawingml/2006/main" xmlns:r="http://schemas.openxmlformats.org/officeDocument/2006/relationships" xmlns:p="http://schemas.openxmlformats.org/presentationml/2006/main">
   <p:cSld>
+    <p:bg>
+      <p:bgPr>
+        <a:gradFill>
+          <a:gsLst>
+            <a:gs pos="0">
+              <a:schemeClr val="accent1">
+                <a:lumMod val="0"/>
+                <a:lumOff val="100000"/>
+              </a:schemeClr>
+            </a:gs>
+            <a:gs pos="30000">
+              <a:schemeClr val="accent1">
+                <a:lumMod val="0"/>
+                <a:lumOff val="100000"/>
+              </a:schemeClr>
+            </a:gs>
+            <a:gs pos="100000">
+              <a:schemeClr val="accent1">
+                <a:lumMod val="100000"/>
+              </a:schemeClr>
+            </a:gs>
+          </a:gsLst>
+          <a:path path="circle">
+            <a:fillToRect l="50000" t="-80000" r="50000" b="180000"/>
+          </a:path>
+        </a:gradFill>
+        <a:effectLst/>
+      </p:bgPr>
+    </p:bg>
     <p:spTree>
       <p:nvGrpSpPr>
         <p:cNvPr id="1" name=""/>
@@ -27705,6 +27957,13 @@
   <p:clrMapOvr>
     <a:masterClrMapping/>
   </p:clrMapOvr>
+  <p:timing>
+    <p:tnLst>
+      <p:par>
+        <p:cTn id="1" dur="indefinite" restart="never" nodeType="tmRoot"/>
+      </p:par>
+    </p:tnLst>
+  </p:timing>
 </p:sld>
 </file>
 
@@ -27914,7 +28173,7 @@
                 <a:lumOff val="100000"/>
               </a:schemeClr>
             </a:gs>
-            <a:gs pos="35000">
+            <a:gs pos="30000">
               <a:schemeClr val="accent1">
                 <a:lumMod val="0"/>
                 <a:lumOff val="100000"/>
@@ -28058,6 +28317,35 @@
 <file path=ppt/slides/slide4.xml><?xml version="1.0" encoding="utf-8"?>
 <p:sld xmlns:a="http://schemas.openxmlformats.org/drawingml/2006/main" xmlns:r="http://schemas.openxmlformats.org/officeDocument/2006/relationships" xmlns:p="http://schemas.openxmlformats.org/presentationml/2006/main">
   <p:cSld>
+    <p:bg>
+      <p:bgPr>
+        <a:gradFill>
+          <a:gsLst>
+            <a:gs pos="0">
+              <a:schemeClr val="accent1">
+                <a:lumMod val="0"/>
+                <a:lumOff val="100000"/>
+              </a:schemeClr>
+            </a:gs>
+            <a:gs pos="30000">
+              <a:schemeClr val="accent1">
+                <a:lumMod val="0"/>
+                <a:lumOff val="100000"/>
+              </a:schemeClr>
+            </a:gs>
+            <a:gs pos="100000">
+              <a:schemeClr val="accent1">
+                <a:lumMod val="100000"/>
+              </a:schemeClr>
+            </a:gs>
+          </a:gsLst>
+          <a:path path="circle">
+            <a:fillToRect l="50000" t="-80000" r="50000" b="180000"/>
+          </a:path>
+        </a:gradFill>
+        <a:effectLst/>
+      </p:bgPr>
+    </p:bg>
     <p:spTree>
       <p:nvGrpSpPr>
         <p:cNvPr id="1" name=""/>
@@ -28228,6 +28516,35 @@
 <file path=ppt/slides/slide5.xml><?xml version="1.0" encoding="utf-8"?>
 <p:sld xmlns:a="http://schemas.openxmlformats.org/drawingml/2006/main" xmlns:r="http://schemas.openxmlformats.org/officeDocument/2006/relationships" xmlns:p="http://schemas.openxmlformats.org/presentationml/2006/main">
   <p:cSld>
+    <p:bg>
+      <p:bgPr>
+        <a:gradFill>
+          <a:gsLst>
+            <a:gs pos="0">
+              <a:schemeClr val="accent1">
+                <a:lumMod val="0"/>
+                <a:lumOff val="100000"/>
+              </a:schemeClr>
+            </a:gs>
+            <a:gs pos="30000">
+              <a:schemeClr val="accent1">
+                <a:lumMod val="0"/>
+                <a:lumOff val="100000"/>
+              </a:schemeClr>
+            </a:gs>
+            <a:gs pos="100000">
+              <a:schemeClr val="accent1">
+                <a:lumMod val="100000"/>
+              </a:schemeClr>
+            </a:gs>
+          </a:gsLst>
+          <a:path path="circle">
+            <a:fillToRect l="50000" t="-80000" r="50000" b="180000"/>
+          </a:path>
+        </a:gradFill>
+        <a:effectLst/>
+      </p:bgPr>
+    </p:bg>
     <p:spTree>
       <p:nvGrpSpPr>
         <p:cNvPr id="1" name=""/>
@@ -28400,6 +28717,35 @@
 <file path=ppt/slides/slide6.xml><?xml version="1.0" encoding="utf-8"?>
 <p:sld xmlns:a="http://schemas.openxmlformats.org/drawingml/2006/main" xmlns:r="http://schemas.openxmlformats.org/officeDocument/2006/relationships" xmlns:p="http://schemas.openxmlformats.org/presentationml/2006/main">
   <p:cSld>
+    <p:bg>
+      <p:bgPr>
+        <a:gradFill>
+          <a:gsLst>
+            <a:gs pos="0">
+              <a:schemeClr val="accent1">
+                <a:lumMod val="0"/>
+                <a:lumOff val="100000"/>
+              </a:schemeClr>
+            </a:gs>
+            <a:gs pos="30000">
+              <a:schemeClr val="accent1">
+                <a:lumMod val="0"/>
+                <a:lumOff val="100000"/>
+              </a:schemeClr>
+            </a:gs>
+            <a:gs pos="100000">
+              <a:schemeClr val="accent1">
+                <a:lumMod val="100000"/>
+              </a:schemeClr>
+            </a:gs>
+          </a:gsLst>
+          <a:path path="circle">
+            <a:fillToRect l="50000" t="-80000" r="50000" b="180000"/>
+          </a:path>
+        </a:gradFill>
+        <a:effectLst/>
+      </p:bgPr>
+    </p:bg>
     <p:spTree>
       <p:nvGrpSpPr>
         <p:cNvPr id="1" name=""/>
@@ -28447,7 +28793,6 @@
               <a:rPr lang="en-US" sz="2000" dirty="0" smtClean="0"/>
               <a:t>.</a:t>
             </a:r>
-            <a:endParaRPr lang="en-US" sz="2000" dirty="0" smtClean="0"/>
           </a:p>
           <a:p>
             <a:endParaRPr lang="en-US" dirty="0"/>
@@ -28529,6 +28874,35 @@
 <file path=ppt/slides/slide7.xml><?xml version="1.0" encoding="utf-8"?>
 <p:sld xmlns:a="http://schemas.openxmlformats.org/drawingml/2006/main" xmlns:r="http://schemas.openxmlformats.org/officeDocument/2006/relationships" xmlns:p="http://schemas.openxmlformats.org/presentationml/2006/main">
   <p:cSld>
+    <p:bg>
+      <p:bgPr>
+        <a:gradFill>
+          <a:gsLst>
+            <a:gs pos="0">
+              <a:schemeClr val="accent1">
+                <a:lumMod val="0"/>
+                <a:lumOff val="100000"/>
+              </a:schemeClr>
+            </a:gs>
+            <a:gs pos="30000">
+              <a:schemeClr val="accent1">
+                <a:lumMod val="0"/>
+                <a:lumOff val="100000"/>
+              </a:schemeClr>
+            </a:gs>
+            <a:gs pos="100000">
+              <a:schemeClr val="accent1">
+                <a:lumMod val="100000"/>
+              </a:schemeClr>
+            </a:gs>
+          </a:gsLst>
+          <a:path path="circle">
+            <a:fillToRect l="50000" t="-80000" r="50000" b="180000"/>
+          </a:path>
+        </a:gradFill>
+        <a:effectLst/>
+      </p:bgPr>
+    </p:bg>
     <p:spTree>
       <p:nvGrpSpPr>
         <p:cNvPr id="1" name=""/>
@@ -28687,6 +29061,35 @@
 <file path=ppt/slides/slide8.xml><?xml version="1.0" encoding="utf-8"?>
 <p:sld xmlns:a="http://schemas.openxmlformats.org/drawingml/2006/main" xmlns:r="http://schemas.openxmlformats.org/officeDocument/2006/relationships" xmlns:p="http://schemas.openxmlformats.org/presentationml/2006/main">
   <p:cSld>
+    <p:bg>
+      <p:bgPr>
+        <a:gradFill>
+          <a:gsLst>
+            <a:gs pos="0">
+              <a:schemeClr val="accent1">
+                <a:lumMod val="0"/>
+                <a:lumOff val="100000"/>
+              </a:schemeClr>
+            </a:gs>
+            <a:gs pos="30000">
+              <a:schemeClr val="accent1">
+                <a:lumMod val="0"/>
+                <a:lumOff val="100000"/>
+              </a:schemeClr>
+            </a:gs>
+            <a:gs pos="100000">
+              <a:schemeClr val="accent1">
+                <a:lumMod val="100000"/>
+              </a:schemeClr>
+            </a:gs>
+          </a:gsLst>
+          <a:path path="circle">
+            <a:fillToRect l="50000" t="-80000" r="50000" b="180000"/>
+          </a:path>
+        </a:gradFill>
+        <a:effectLst/>
+      </p:bgPr>
+    </p:bg>
     <p:spTree>
       <p:nvGrpSpPr>
         <p:cNvPr id="1" name=""/>
@@ -28814,12 +29217,48 @@
   <p:clrMapOvr>
     <a:masterClrMapping/>
   </p:clrMapOvr>
+  <p:timing>
+    <p:tnLst>
+      <p:par>
+        <p:cTn id="1" dur="indefinite" restart="never" nodeType="tmRoot"/>
+      </p:par>
+    </p:tnLst>
+  </p:timing>
 </p:sld>
 </file>
 
 <file path=ppt/slides/slide9.xml><?xml version="1.0" encoding="utf-8"?>
 <p:sld xmlns:a="http://schemas.openxmlformats.org/drawingml/2006/main" xmlns:r="http://schemas.openxmlformats.org/officeDocument/2006/relationships" xmlns:p="http://schemas.openxmlformats.org/presentationml/2006/main">
   <p:cSld>
+    <p:bg>
+      <p:bgPr>
+        <a:gradFill>
+          <a:gsLst>
+            <a:gs pos="0">
+              <a:schemeClr val="accent1">
+                <a:lumMod val="0"/>
+                <a:lumOff val="100000"/>
+              </a:schemeClr>
+            </a:gs>
+            <a:gs pos="30000">
+              <a:schemeClr val="accent1">
+                <a:lumMod val="0"/>
+                <a:lumOff val="100000"/>
+              </a:schemeClr>
+            </a:gs>
+            <a:gs pos="100000">
+              <a:schemeClr val="accent1">
+                <a:lumMod val="100000"/>
+              </a:schemeClr>
+            </a:gs>
+          </a:gsLst>
+          <a:path path="circle">
+            <a:fillToRect l="50000" t="-80000" r="50000" b="180000"/>
+          </a:path>
+        </a:gradFill>
+        <a:effectLst/>
+      </p:bgPr>
+    </p:bg>
     <p:spTree>
       <p:nvGrpSpPr>
         <p:cNvPr id="1" name=""/>
@@ -28896,6 +29335,13 @@
   <p:clrMapOvr>
     <a:masterClrMapping/>
   </p:clrMapOvr>
+  <p:timing>
+    <p:tnLst>
+      <p:par>
+        <p:cTn id="1" dur="indefinite" restart="never" nodeType="tmRoot"/>
+      </p:par>
+    </p:tnLst>
+  </p:timing>
 </p:sld>
 </file>
 

</xml_diff>